<commit_message>
Add Timestamp and start parsing Victron Data
</commit_message>
<xml_diff>
--- a/Notes/Slide Deck.pptx
+++ b/Notes/Slide Deck.pptx
@@ -105,6 +105,11 @@
       </a:defRPr>
     </a:lvl9pPr>
   </p:defaultTextStyle>
+  <p:extLst>
+    <p:ext uri="{EFAFB233-063F-42B5-8137-9DF3F51BA10A}">
+      <p15:sldGuideLst xmlns:p15="http://schemas.microsoft.com/office/powerpoint/2012/main"/>
+    </p:ext>
+  </p:extLst>
 </p:presentation>
 </file>
 
@@ -4052,7 +4057,7 @@
             </a:pPr>
             <a:r>
               <a:rPr lang="en-US" dirty="0"/>
-              <a:t>1. Background		2. Daily Energy Data	3.</a:t>
+              <a:t>1. Background		2. Energy Meter Data	3.</a:t>
             </a:r>
           </a:p>
           <a:p>
@@ -4454,17 +4459,414 @@
           <a:effectLst>
             <a:reflection blurRad="12700" stA="38000" endPos="28000" dist="5000" dir="5400000" sy="-100000" algn="bl" rotWithShape="0"/>
           </a:effectLst>
-          <a:extLst>
-            <a:ext uri="{909E8E84-426E-40DD-AFC4-6F175D3DCCD1}">
-              <a14:hiddenFill xmlns:a14="http://schemas.microsoft.com/office/drawing/2010/main">
-                <a:solidFill>
-                  <a:srgbClr val="FFFFFF"/>
-                </a:solidFill>
-              </a14:hiddenFill>
-            </a:ext>
-          </a:extLst>
         </p:spPr>
       </p:pic>
+      <p:sp>
+        <p:nvSpPr>
+          <p:cNvPr id="7" name="Content Placeholder 2">
+            <a:extLst>
+              <a:ext uri="{FF2B5EF4-FFF2-40B4-BE49-F238E27FC236}">
+                <a16:creationId xmlns:a16="http://schemas.microsoft.com/office/drawing/2014/main" id="{3CF8C64E-A30C-3A60-BBB2-518E7C1CD162}"/>
+              </a:ext>
+            </a:extLst>
+          </p:cNvPr>
+          <p:cNvSpPr txBox="1">
+            <a:spLocks/>
+          </p:cNvSpPr>
+          <p:nvPr/>
+        </p:nvSpPr>
+        <p:spPr>
+          <a:xfrm>
+            <a:off x="4136995" y="3740798"/>
+            <a:ext cx="435006" cy="364332"/>
+          </a:xfrm>
+          <a:prstGeom prst="rect">
+            <a:avLst/>
+          </a:prstGeom>
+        </p:spPr>
+        <p:txBody>
+          <a:bodyPr vert="horz" lIns="91440" tIns="45720" rIns="91440" bIns="45720" rtlCol="0">
+            <a:normAutofit fontScale="85000" lnSpcReduction="20000"/>
+          </a:bodyPr>
+          <a:lstStyle>
+            <a:lvl1pPr marL="228600" indent="-228600" algn="l" defTabSz="914400" rtl="0" eaLnBrk="1" latinLnBrk="0" hangingPunct="1">
+              <a:lnSpc>
+                <a:spcPct val="90000"/>
+              </a:lnSpc>
+              <a:spcBef>
+                <a:spcPts val="1000"/>
+              </a:spcBef>
+              <a:buFont typeface="Arial" panose="020B0604020202020204" pitchFamily="34" charset="0"/>
+              <a:buChar char="•"/>
+              <a:defRPr sz="2800" kern="1200">
+                <a:solidFill>
+                  <a:schemeClr val="tx1"/>
+                </a:solidFill>
+                <a:latin typeface="+mn-lt"/>
+                <a:ea typeface="+mn-ea"/>
+                <a:cs typeface="+mn-cs"/>
+              </a:defRPr>
+            </a:lvl1pPr>
+            <a:lvl2pPr marL="685800" indent="-228600" algn="l" defTabSz="914400" rtl="0" eaLnBrk="1" latinLnBrk="0" hangingPunct="1">
+              <a:lnSpc>
+                <a:spcPct val="90000"/>
+              </a:lnSpc>
+              <a:spcBef>
+                <a:spcPts val="500"/>
+              </a:spcBef>
+              <a:buFont typeface="Arial" panose="020B0604020202020204" pitchFamily="34" charset="0"/>
+              <a:buChar char="•"/>
+              <a:defRPr sz="2400" kern="1200">
+                <a:solidFill>
+                  <a:schemeClr val="tx1"/>
+                </a:solidFill>
+                <a:latin typeface="+mn-lt"/>
+                <a:ea typeface="+mn-ea"/>
+                <a:cs typeface="+mn-cs"/>
+              </a:defRPr>
+            </a:lvl2pPr>
+            <a:lvl3pPr marL="1143000" indent="-228600" algn="l" defTabSz="914400" rtl="0" eaLnBrk="1" latinLnBrk="0" hangingPunct="1">
+              <a:lnSpc>
+                <a:spcPct val="90000"/>
+              </a:lnSpc>
+              <a:spcBef>
+                <a:spcPts val="500"/>
+              </a:spcBef>
+              <a:buFont typeface="Arial" panose="020B0604020202020204" pitchFamily="34" charset="0"/>
+              <a:buChar char="•"/>
+              <a:defRPr sz="2000" kern="1200">
+                <a:solidFill>
+                  <a:schemeClr val="tx1"/>
+                </a:solidFill>
+                <a:latin typeface="+mn-lt"/>
+                <a:ea typeface="+mn-ea"/>
+                <a:cs typeface="+mn-cs"/>
+              </a:defRPr>
+            </a:lvl3pPr>
+            <a:lvl4pPr marL="1600200" indent="-228600" algn="l" defTabSz="914400" rtl="0" eaLnBrk="1" latinLnBrk="0" hangingPunct="1">
+              <a:lnSpc>
+                <a:spcPct val="90000"/>
+              </a:lnSpc>
+              <a:spcBef>
+                <a:spcPts val="500"/>
+              </a:spcBef>
+              <a:buFont typeface="Arial" panose="020B0604020202020204" pitchFamily="34" charset="0"/>
+              <a:buChar char="•"/>
+              <a:defRPr sz="1800" kern="1200">
+                <a:solidFill>
+                  <a:schemeClr val="tx1"/>
+                </a:solidFill>
+                <a:latin typeface="+mn-lt"/>
+                <a:ea typeface="+mn-ea"/>
+                <a:cs typeface="+mn-cs"/>
+              </a:defRPr>
+            </a:lvl4pPr>
+            <a:lvl5pPr marL="2057400" indent="-228600" algn="l" defTabSz="914400" rtl="0" eaLnBrk="1" latinLnBrk="0" hangingPunct="1">
+              <a:lnSpc>
+                <a:spcPct val="90000"/>
+              </a:lnSpc>
+              <a:spcBef>
+                <a:spcPts val="500"/>
+              </a:spcBef>
+              <a:buFont typeface="Arial" panose="020B0604020202020204" pitchFamily="34" charset="0"/>
+              <a:buChar char="•"/>
+              <a:defRPr sz="1800" kern="1200">
+                <a:solidFill>
+                  <a:schemeClr val="tx1"/>
+                </a:solidFill>
+                <a:latin typeface="+mn-lt"/>
+                <a:ea typeface="+mn-ea"/>
+                <a:cs typeface="+mn-cs"/>
+              </a:defRPr>
+            </a:lvl5pPr>
+            <a:lvl6pPr marL="2514600" indent="-228600" algn="l" defTabSz="914400" rtl="0" eaLnBrk="1" latinLnBrk="0" hangingPunct="1">
+              <a:lnSpc>
+                <a:spcPct val="90000"/>
+              </a:lnSpc>
+              <a:spcBef>
+                <a:spcPts val="500"/>
+              </a:spcBef>
+              <a:buFont typeface="Arial" panose="020B0604020202020204" pitchFamily="34" charset="0"/>
+              <a:buChar char="•"/>
+              <a:defRPr sz="1800" kern="1200">
+                <a:solidFill>
+                  <a:schemeClr val="tx1"/>
+                </a:solidFill>
+                <a:latin typeface="+mn-lt"/>
+                <a:ea typeface="+mn-ea"/>
+                <a:cs typeface="+mn-cs"/>
+              </a:defRPr>
+            </a:lvl6pPr>
+            <a:lvl7pPr marL="2971800" indent="-228600" algn="l" defTabSz="914400" rtl="0" eaLnBrk="1" latinLnBrk="0" hangingPunct="1">
+              <a:lnSpc>
+                <a:spcPct val="90000"/>
+              </a:lnSpc>
+              <a:spcBef>
+                <a:spcPts val="500"/>
+              </a:spcBef>
+              <a:buFont typeface="Arial" panose="020B0604020202020204" pitchFamily="34" charset="0"/>
+              <a:buChar char="•"/>
+              <a:defRPr sz="1800" kern="1200">
+                <a:solidFill>
+                  <a:schemeClr val="tx1"/>
+                </a:solidFill>
+                <a:latin typeface="+mn-lt"/>
+                <a:ea typeface="+mn-ea"/>
+                <a:cs typeface="+mn-cs"/>
+              </a:defRPr>
+            </a:lvl7pPr>
+            <a:lvl8pPr marL="3429000" indent="-228600" algn="l" defTabSz="914400" rtl="0" eaLnBrk="1" latinLnBrk="0" hangingPunct="1">
+              <a:lnSpc>
+                <a:spcPct val="90000"/>
+              </a:lnSpc>
+              <a:spcBef>
+                <a:spcPts val="500"/>
+              </a:spcBef>
+              <a:buFont typeface="Arial" panose="020B0604020202020204" pitchFamily="34" charset="0"/>
+              <a:buChar char="•"/>
+              <a:defRPr sz="1800" kern="1200">
+                <a:solidFill>
+                  <a:schemeClr val="tx1"/>
+                </a:solidFill>
+                <a:latin typeface="+mn-lt"/>
+                <a:ea typeface="+mn-ea"/>
+                <a:cs typeface="+mn-cs"/>
+              </a:defRPr>
+            </a:lvl8pPr>
+            <a:lvl9pPr marL="3886200" indent="-228600" algn="l" defTabSz="914400" rtl="0" eaLnBrk="1" latinLnBrk="0" hangingPunct="1">
+              <a:lnSpc>
+                <a:spcPct val="90000"/>
+              </a:lnSpc>
+              <a:spcBef>
+                <a:spcPts val="500"/>
+              </a:spcBef>
+              <a:buFont typeface="Arial" panose="020B0604020202020204" pitchFamily="34" charset="0"/>
+              <a:buChar char="•"/>
+              <a:defRPr sz="1800" kern="1200">
+                <a:solidFill>
+                  <a:schemeClr val="tx1"/>
+                </a:solidFill>
+                <a:latin typeface="+mn-lt"/>
+                <a:ea typeface="+mn-ea"/>
+                <a:cs typeface="+mn-cs"/>
+              </a:defRPr>
+            </a:lvl9pPr>
+          </a:lstStyle>
+          <a:p>
+            <a:pPr marL="0" indent="0">
+              <a:buFont typeface="Arial" panose="020B0604020202020204" pitchFamily="34" charset="0"/>
+              <a:buNone/>
+            </a:pPr>
+            <a:r>
+              <a:rPr lang="en-US" dirty="0"/>
+              <a:t>+</a:t>
+            </a:r>
+          </a:p>
+        </p:txBody>
+      </p:sp>
+      <p:sp>
+        <p:nvSpPr>
+          <p:cNvPr id="9" name="Content Placeholder 2">
+            <a:extLst>
+              <a:ext uri="{FF2B5EF4-FFF2-40B4-BE49-F238E27FC236}">
+                <a16:creationId xmlns:a16="http://schemas.microsoft.com/office/drawing/2014/main" id="{AC9BF74D-A91F-CFAF-1215-8BA404461BB8}"/>
+              </a:ext>
+            </a:extLst>
+          </p:cNvPr>
+          <p:cNvSpPr txBox="1">
+            <a:spLocks/>
+          </p:cNvSpPr>
+          <p:nvPr/>
+        </p:nvSpPr>
+        <p:spPr>
+          <a:xfrm>
+            <a:off x="7760041" y="3740798"/>
+            <a:ext cx="435006" cy="364332"/>
+          </a:xfrm>
+          <a:prstGeom prst="rect">
+            <a:avLst/>
+          </a:prstGeom>
+        </p:spPr>
+        <p:txBody>
+          <a:bodyPr vert="horz" lIns="91440" tIns="45720" rIns="91440" bIns="45720" rtlCol="0">
+            <a:normAutofit fontScale="85000" lnSpcReduction="20000"/>
+          </a:bodyPr>
+          <a:lstStyle>
+            <a:lvl1pPr marL="228600" indent="-228600" algn="l" defTabSz="914400" rtl="0" eaLnBrk="1" latinLnBrk="0" hangingPunct="1">
+              <a:lnSpc>
+                <a:spcPct val="90000"/>
+              </a:lnSpc>
+              <a:spcBef>
+                <a:spcPts val="1000"/>
+              </a:spcBef>
+              <a:buFont typeface="Arial" panose="020B0604020202020204" pitchFamily="34" charset="0"/>
+              <a:buChar char="•"/>
+              <a:defRPr sz="2800" kern="1200">
+                <a:solidFill>
+                  <a:schemeClr val="tx1"/>
+                </a:solidFill>
+                <a:latin typeface="+mn-lt"/>
+                <a:ea typeface="+mn-ea"/>
+                <a:cs typeface="+mn-cs"/>
+              </a:defRPr>
+            </a:lvl1pPr>
+            <a:lvl2pPr marL="685800" indent="-228600" algn="l" defTabSz="914400" rtl="0" eaLnBrk="1" latinLnBrk="0" hangingPunct="1">
+              <a:lnSpc>
+                <a:spcPct val="90000"/>
+              </a:lnSpc>
+              <a:spcBef>
+                <a:spcPts val="500"/>
+              </a:spcBef>
+              <a:buFont typeface="Arial" panose="020B0604020202020204" pitchFamily="34" charset="0"/>
+              <a:buChar char="•"/>
+              <a:defRPr sz="2400" kern="1200">
+                <a:solidFill>
+                  <a:schemeClr val="tx1"/>
+                </a:solidFill>
+                <a:latin typeface="+mn-lt"/>
+                <a:ea typeface="+mn-ea"/>
+                <a:cs typeface="+mn-cs"/>
+              </a:defRPr>
+            </a:lvl2pPr>
+            <a:lvl3pPr marL="1143000" indent="-228600" algn="l" defTabSz="914400" rtl="0" eaLnBrk="1" latinLnBrk="0" hangingPunct="1">
+              <a:lnSpc>
+                <a:spcPct val="90000"/>
+              </a:lnSpc>
+              <a:spcBef>
+                <a:spcPts val="500"/>
+              </a:spcBef>
+              <a:buFont typeface="Arial" panose="020B0604020202020204" pitchFamily="34" charset="0"/>
+              <a:buChar char="•"/>
+              <a:defRPr sz="2000" kern="1200">
+                <a:solidFill>
+                  <a:schemeClr val="tx1"/>
+                </a:solidFill>
+                <a:latin typeface="+mn-lt"/>
+                <a:ea typeface="+mn-ea"/>
+                <a:cs typeface="+mn-cs"/>
+              </a:defRPr>
+            </a:lvl3pPr>
+            <a:lvl4pPr marL="1600200" indent="-228600" algn="l" defTabSz="914400" rtl="0" eaLnBrk="1" latinLnBrk="0" hangingPunct="1">
+              <a:lnSpc>
+                <a:spcPct val="90000"/>
+              </a:lnSpc>
+              <a:spcBef>
+                <a:spcPts val="500"/>
+              </a:spcBef>
+              <a:buFont typeface="Arial" panose="020B0604020202020204" pitchFamily="34" charset="0"/>
+              <a:buChar char="•"/>
+              <a:defRPr sz="1800" kern="1200">
+                <a:solidFill>
+                  <a:schemeClr val="tx1"/>
+                </a:solidFill>
+                <a:latin typeface="+mn-lt"/>
+                <a:ea typeface="+mn-ea"/>
+                <a:cs typeface="+mn-cs"/>
+              </a:defRPr>
+            </a:lvl4pPr>
+            <a:lvl5pPr marL="2057400" indent="-228600" algn="l" defTabSz="914400" rtl="0" eaLnBrk="1" latinLnBrk="0" hangingPunct="1">
+              <a:lnSpc>
+                <a:spcPct val="90000"/>
+              </a:lnSpc>
+              <a:spcBef>
+                <a:spcPts val="500"/>
+              </a:spcBef>
+              <a:buFont typeface="Arial" panose="020B0604020202020204" pitchFamily="34" charset="0"/>
+              <a:buChar char="•"/>
+              <a:defRPr sz="1800" kern="1200">
+                <a:solidFill>
+                  <a:schemeClr val="tx1"/>
+                </a:solidFill>
+                <a:latin typeface="+mn-lt"/>
+                <a:ea typeface="+mn-ea"/>
+                <a:cs typeface="+mn-cs"/>
+              </a:defRPr>
+            </a:lvl5pPr>
+            <a:lvl6pPr marL="2514600" indent="-228600" algn="l" defTabSz="914400" rtl="0" eaLnBrk="1" latinLnBrk="0" hangingPunct="1">
+              <a:lnSpc>
+                <a:spcPct val="90000"/>
+              </a:lnSpc>
+              <a:spcBef>
+                <a:spcPts val="500"/>
+              </a:spcBef>
+              <a:buFont typeface="Arial" panose="020B0604020202020204" pitchFamily="34" charset="0"/>
+              <a:buChar char="•"/>
+              <a:defRPr sz="1800" kern="1200">
+                <a:solidFill>
+                  <a:schemeClr val="tx1"/>
+                </a:solidFill>
+                <a:latin typeface="+mn-lt"/>
+                <a:ea typeface="+mn-ea"/>
+                <a:cs typeface="+mn-cs"/>
+              </a:defRPr>
+            </a:lvl6pPr>
+            <a:lvl7pPr marL="2971800" indent="-228600" algn="l" defTabSz="914400" rtl="0" eaLnBrk="1" latinLnBrk="0" hangingPunct="1">
+              <a:lnSpc>
+                <a:spcPct val="90000"/>
+              </a:lnSpc>
+              <a:spcBef>
+                <a:spcPts val="500"/>
+              </a:spcBef>
+              <a:buFont typeface="Arial" panose="020B0604020202020204" pitchFamily="34" charset="0"/>
+              <a:buChar char="•"/>
+              <a:defRPr sz="1800" kern="1200">
+                <a:solidFill>
+                  <a:schemeClr val="tx1"/>
+                </a:solidFill>
+                <a:latin typeface="+mn-lt"/>
+                <a:ea typeface="+mn-ea"/>
+                <a:cs typeface="+mn-cs"/>
+              </a:defRPr>
+            </a:lvl7pPr>
+            <a:lvl8pPr marL="3429000" indent="-228600" algn="l" defTabSz="914400" rtl="0" eaLnBrk="1" latinLnBrk="0" hangingPunct="1">
+              <a:lnSpc>
+                <a:spcPct val="90000"/>
+              </a:lnSpc>
+              <a:spcBef>
+                <a:spcPts val="500"/>
+              </a:spcBef>
+              <a:buFont typeface="Arial" panose="020B0604020202020204" pitchFamily="34" charset="0"/>
+              <a:buChar char="•"/>
+              <a:defRPr sz="1800" kern="1200">
+                <a:solidFill>
+                  <a:schemeClr val="tx1"/>
+                </a:solidFill>
+                <a:latin typeface="+mn-lt"/>
+                <a:ea typeface="+mn-ea"/>
+                <a:cs typeface="+mn-cs"/>
+              </a:defRPr>
+            </a:lvl8pPr>
+            <a:lvl9pPr marL="3886200" indent="-228600" algn="l" defTabSz="914400" rtl="0" eaLnBrk="1" latinLnBrk="0" hangingPunct="1">
+              <a:lnSpc>
+                <a:spcPct val="90000"/>
+              </a:lnSpc>
+              <a:spcBef>
+                <a:spcPts val="500"/>
+              </a:spcBef>
+              <a:buFont typeface="Arial" panose="020B0604020202020204" pitchFamily="34" charset="0"/>
+              <a:buChar char="•"/>
+              <a:defRPr sz="1800" kern="1200">
+                <a:solidFill>
+                  <a:schemeClr val="tx1"/>
+                </a:solidFill>
+                <a:latin typeface="+mn-lt"/>
+                <a:ea typeface="+mn-ea"/>
+                <a:cs typeface="+mn-cs"/>
+              </a:defRPr>
+            </a:lvl9pPr>
+          </a:lstStyle>
+          <a:p>
+            <a:pPr marL="0" indent="0">
+              <a:buFont typeface="Arial" panose="020B0604020202020204" pitchFamily="34" charset="0"/>
+              <a:buNone/>
+            </a:pPr>
+            <a:r>
+              <a:rPr lang="en-US" dirty="0"/>
+              <a:t>=</a:t>
+            </a:r>
+          </a:p>
+        </p:txBody>
+      </p:sp>
     </p:spTree>
     <p:extLst>
       <p:ext uri="{BB962C8B-B14F-4D97-AF65-F5344CB8AC3E}">

</xml_diff>